<commit_message>
update HTML sequence viewer
</commit_message>
<xml_diff>
--- a/Document/Librator.pptx
+++ b/Document/Librator.pptx
@@ -12184,7 +12184,7 @@
           <a:p>
             <a:fld id="{B55D29DC-5CFD-5C40-8399-0CA08882BC4A}" type="datetimeFigureOut">
               <a:rPr lang="en-US" smtClean="0"/>
-              <a:t>12/6/19</a:t>
+              <a:t>1/2/20</a:t>
             </a:fld>
             <a:endParaRPr lang="en-US"/>
           </a:p>
@@ -12598,7 +12598,7 @@
           <a:p>
             <a:fld id="{F02628E0-3F55-E64B-866B-185FD039DD29}" type="datetimeFigureOut">
               <a:rPr lang="en-US" smtClean="0"/>
-              <a:t>12/6/19</a:t>
+              <a:t>1/2/20</a:t>
             </a:fld>
             <a:endParaRPr lang="en-US"/>
           </a:p>
@@ -12796,7 +12796,7 @@
           <a:p>
             <a:fld id="{F02628E0-3F55-E64B-866B-185FD039DD29}" type="datetimeFigureOut">
               <a:rPr lang="en-US" smtClean="0"/>
-              <a:t>12/6/19</a:t>
+              <a:t>1/2/20</a:t>
             </a:fld>
             <a:endParaRPr lang="en-US"/>
           </a:p>
@@ -13004,7 +13004,7 @@
           <a:p>
             <a:fld id="{F02628E0-3F55-E64B-866B-185FD039DD29}" type="datetimeFigureOut">
               <a:rPr lang="en-US" smtClean="0"/>
-              <a:t>12/6/19</a:t>
+              <a:t>1/2/20</a:t>
             </a:fld>
             <a:endParaRPr lang="en-US"/>
           </a:p>
@@ -13202,7 +13202,7 @@
           <a:p>
             <a:fld id="{F02628E0-3F55-E64B-866B-185FD039DD29}" type="datetimeFigureOut">
               <a:rPr lang="en-US" smtClean="0"/>
-              <a:t>12/6/19</a:t>
+              <a:t>1/2/20</a:t>
             </a:fld>
             <a:endParaRPr lang="en-US"/>
           </a:p>
@@ -13477,7 +13477,7 @@
           <a:p>
             <a:fld id="{F02628E0-3F55-E64B-866B-185FD039DD29}" type="datetimeFigureOut">
               <a:rPr lang="en-US" smtClean="0"/>
-              <a:t>12/6/19</a:t>
+              <a:t>1/2/20</a:t>
             </a:fld>
             <a:endParaRPr lang="en-US"/>
           </a:p>
@@ -13742,7 +13742,7 @@
           <a:p>
             <a:fld id="{F02628E0-3F55-E64B-866B-185FD039DD29}" type="datetimeFigureOut">
               <a:rPr lang="en-US" smtClean="0"/>
-              <a:t>12/6/19</a:t>
+              <a:t>1/2/20</a:t>
             </a:fld>
             <a:endParaRPr lang="en-US"/>
           </a:p>
@@ -14154,7 +14154,7 @@
           <a:p>
             <a:fld id="{F02628E0-3F55-E64B-866B-185FD039DD29}" type="datetimeFigureOut">
               <a:rPr lang="en-US" smtClean="0"/>
-              <a:t>12/6/19</a:t>
+              <a:t>1/2/20</a:t>
             </a:fld>
             <a:endParaRPr lang="en-US"/>
           </a:p>
@@ -14295,7 +14295,7 @@
           <a:p>
             <a:fld id="{F02628E0-3F55-E64B-866B-185FD039DD29}" type="datetimeFigureOut">
               <a:rPr lang="en-US" smtClean="0"/>
-              <a:t>12/6/19</a:t>
+              <a:t>1/2/20</a:t>
             </a:fld>
             <a:endParaRPr lang="en-US"/>
           </a:p>
@@ -14408,7 +14408,7 @@
           <a:p>
             <a:fld id="{F02628E0-3F55-E64B-866B-185FD039DD29}" type="datetimeFigureOut">
               <a:rPr lang="en-US" smtClean="0"/>
-              <a:t>12/6/19</a:t>
+              <a:t>1/2/20</a:t>
             </a:fld>
             <a:endParaRPr lang="en-US"/>
           </a:p>
@@ -14719,7 +14719,7 @@
           <a:p>
             <a:fld id="{F02628E0-3F55-E64B-866B-185FD039DD29}" type="datetimeFigureOut">
               <a:rPr lang="en-US" smtClean="0"/>
-              <a:t>12/6/19</a:t>
+              <a:t>1/2/20</a:t>
             </a:fld>
             <a:endParaRPr lang="en-US"/>
           </a:p>
@@ -15007,7 +15007,7 @@
           <a:p>
             <a:fld id="{F02628E0-3F55-E64B-866B-185FD039DD29}" type="datetimeFigureOut">
               <a:rPr lang="en-US" smtClean="0"/>
-              <a:t>12/6/19</a:t>
+              <a:t>1/2/20</a:t>
             </a:fld>
             <a:endParaRPr lang="en-US"/>
           </a:p>
@@ -15248,7 +15248,7 @@
           <a:p>
             <a:fld id="{F02628E0-3F55-E64B-866B-185FD039DD29}" type="datetimeFigureOut">
               <a:rPr lang="en-US" smtClean="0"/>
-              <a:t>12/6/19</a:t>
+              <a:t>1/2/20</a:t>
             </a:fld>
             <a:endParaRPr lang="en-US"/>
           </a:p>
@@ -30488,7 +30488,7 @@
         </p:nvSpPr>
         <p:spPr>
           <a:xfrm rot="16200000">
-            <a:off x="2792267" y="2364453"/>
+            <a:off x="2785961" y="2364453"/>
             <a:ext cx="111149" cy="155122"/>
           </a:xfrm>
           <a:prstGeom prst="rect">

</xml_diff>

<commit_message>
Update error message display.
</commit_message>
<xml_diff>
--- a/Document/Librator.pptx
+++ b/Document/Librator.pptx
@@ -12184,7 +12184,7 @@
           <a:p>
             <a:fld id="{B55D29DC-5CFD-5C40-8399-0CA08882BC4A}" type="datetimeFigureOut">
               <a:rPr lang="en-US" smtClean="0"/>
-              <a:t>1/2/20</a:t>
+              <a:t>1/13/20</a:t>
             </a:fld>
             <a:endParaRPr lang="en-US"/>
           </a:p>
@@ -12598,7 +12598,7 @@
           <a:p>
             <a:fld id="{F02628E0-3F55-E64B-866B-185FD039DD29}" type="datetimeFigureOut">
               <a:rPr lang="en-US" smtClean="0"/>
-              <a:t>1/2/20</a:t>
+              <a:t>1/13/20</a:t>
             </a:fld>
             <a:endParaRPr lang="en-US"/>
           </a:p>
@@ -12796,7 +12796,7 @@
           <a:p>
             <a:fld id="{F02628E0-3F55-E64B-866B-185FD039DD29}" type="datetimeFigureOut">
               <a:rPr lang="en-US" smtClean="0"/>
-              <a:t>1/2/20</a:t>
+              <a:t>1/13/20</a:t>
             </a:fld>
             <a:endParaRPr lang="en-US"/>
           </a:p>
@@ -13004,7 +13004,7 @@
           <a:p>
             <a:fld id="{F02628E0-3F55-E64B-866B-185FD039DD29}" type="datetimeFigureOut">
               <a:rPr lang="en-US" smtClean="0"/>
-              <a:t>1/2/20</a:t>
+              <a:t>1/13/20</a:t>
             </a:fld>
             <a:endParaRPr lang="en-US"/>
           </a:p>
@@ -13202,7 +13202,7 @@
           <a:p>
             <a:fld id="{F02628E0-3F55-E64B-866B-185FD039DD29}" type="datetimeFigureOut">
               <a:rPr lang="en-US" smtClean="0"/>
-              <a:t>1/2/20</a:t>
+              <a:t>1/13/20</a:t>
             </a:fld>
             <a:endParaRPr lang="en-US"/>
           </a:p>
@@ -13477,7 +13477,7 @@
           <a:p>
             <a:fld id="{F02628E0-3F55-E64B-866B-185FD039DD29}" type="datetimeFigureOut">
               <a:rPr lang="en-US" smtClean="0"/>
-              <a:t>1/2/20</a:t>
+              <a:t>1/13/20</a:t>
             </a:fld>
             <a:endParaRPr lang="en-US"/>
           </a:p>
@@ -13742,7 +13742,7 @@
           <a:p>
             <a:fld id="{F02628E0-3F55-E64B-866B-185FD039DD29}" type="datetimeFigureOut">
               <a:rPr lang="en-US" smtClean="0"/>
-              <a:t>1/2/20</a:t>
+              <a:t>1/13/20</a:t>
             </a:fld>
             <a:endParaRPr lang="en-US"/>
           </a:p>
@@ -14154,7 +14154,7 @@
           <a:p>
             <a:fld id="{F02628E0-3F55-E64B-866B-185FD039DD29}" type="datetimeFigureOut">
               <a:rPr lang="en-US" smtClean="0"/>
-              <a:t>1/2/20</a:t>
+              <a:t>1/13/20</a:t>
             </a:fld>
             <a:endParaRPr lang="en-US"/>
           </a:p>
@@ -14295,7 +14295,7 @@
           <a:p>
             <a:fld id="{F02628E0-3F55-E64B-866B-185FD039DD29}" type="datetimeFigureOut">
               <a:rPr lang="en-US" smtClean="0"/>
-              <a:t>1/2/20</a:t>
+              <a:t>1/13/20</a:t>
             </a:fld>
             <a:endParaRPr lang="en-US"/>
           </a:p>
@@ -14408,7 +14408,7 @@
           <a:p>
             <a:fld id="{F02628E0-3F55-E64B-866B-185FD039DD29}" type="datetimeFigureOut">
               <a:rPr lang="en-US" smtClean="0"/>
-              <a:t>1/2/20</a:t>
+              <a:t>1/13/20</a:t>
             </a:fld>
             <a:endParaRPr lang="en-US"/>
           </a:p>
@@ -14719,7 +14719,7 @@
           <a:p>
             <a:fld id="{F02628E0-3F55-E64B-866B-185FD039DD29}" type="datetimeFigureOut">
               <a:rPr lang="en-US" smtClean="0"/>
-              <a:t>1/2/20</a:t>
+              <a:t>1/13/20</a:t>
             </a:fld>
             <a:endParaRPr lang="en-US"/>
           </a:p>
@@ -15007,7 +15007,7 @@
           <a:p>
             <a:fld id="{F02628E0-3F55-E64B-866B-185FD039DD29}" type="datetimeFigureOut">
               <a:rPr lang="en-US" smtClean="0"/>
-              <a:t>1/2/20</a:t>
+              <a:t>1/13/20</a:t>
             </a:fld>
             <a:endParaRPr lang="en-US"/>
           </a:p>
@@ -15248,7 +15248,7 @@
           <a:p>
             <a:fld id="{F02628E0-3F55-E64B-866B-185FD039DD29}" type="datetimeFigureOut">
               <a:rPr lang="en-US" smtClean="0"/>
-              <a:t>1/2/20</a:t>
+              <a:t>1/13/20</a:t>
             </a:fld>
             <a:endParaRPr lang="en-US"/>
           </a:p>
@@ -25259,10 +25259,10 @@
       </p:sp>
       <p:pic>
         <p:nvPicPr>
-          <p:cNvPr id="5" name="Picture 4">
-            <a:extLst>
-              <a:ext uri="{FF2B5EF4-FFF2-40B4-BE49-F238E27FC236}">
-                <a16:creationId xmlns:a16="http://schemas.microsoft.com/office/drawing/2014/main" id="{EF1637C3-CE9D-3446-B8A5-4E961334BE21}"/>
+          <p:cNvPr id="6" name="Picture 5">
+            <a:extLst>
+              <a:ext uri="{FF2B5EF4-FFF2-40B4-BE49-F238E27FC236}">
+                <a16:creationId xmlns:a16="http://schemas.microsoft.com/office/drawing/2014/main" id="{3AF9D55F-A895-6549-A66E-6906802E1E3F}"/>
               </a:ext>
             </a:extLst>
           </p:cNvPr>
@@ -25279,8 +25279,8 @@
         </p:blipFill>
         <p:spPr>
           <a:xfrm>
-            <a:off x="4615089" y="2353015"/>
-            <a:ext cx="2961822" cy="2961822"/>
+            <a:off x="4444102" y="2511052"/>
+            <a:ext cx="3303795" cy="3303795"/>
           </a:xfrm>
           <a:prstGeom prst="rect">
             <a:avLst/>
@@ -28570,8 +28570,8 @@
           </a:p>
         </p:txBody>
       </p:sp>
-      <mc:AlternateContent xmlns:mc="http://schemas.openxmlformats.org/markup-compatibility/2006" xmlns:a14="http://schemas.microsoft.com/office/drawing/2010/main">
-        <mc:Choice Requires="a14">
+      <mc:AlternateContent xmlns:mc="http://schemas.openxmlformats.org/markup-compatibility/2006">
+        <mc:Choice xmlns:a14="http://schemas.microsoft.com/office/drawing/2010/main" Requires="a14">
           <p:sp>
             <p:nvSpPr>
               <p:cNvPr id="3" name="Content Placeholder 2">
@@ -28648,7 +28648,7 @@
                             <a:latin typeface="Cambria Math" panose="02040503050406030204" pitchFamily="18" charset="0"/>
                             <a:cs typeface="Times New Roman" panose="02020603050405020304" pitchFamily="18" charset="0"/>
                           </a:rPr>
-                          <m:t>2</m:t>
+                          <m:t>10</m:t>
                         </m:r>
                       </m:sub>
                     </m:sSub>
@@ -28973,7 +28973,7 @@
             </p:txBody>
           </p:sp>
         </mc:Choice>
-        <mc:Fallback xmlns="">
+        <mc:Fallback>
           <p:sp>
             <p:nvSpPr>
               <p:cNvPr id="3" name="Content Placeholder 2">
@@ -29017,8 +29017,8 @@
           </p:sp>
         </mc:Fallback>
       </mc:AlternateContent>
-      <mc:AlternateContent xmlns:mc="http://schemas.openxmlformats.org/markup-compatibility/2006" xmlns:a14="http://schemas.microsoft.com/office/drawing/2010/main">
-        <mc:Choice Requires="a14">
+      <mc:AlternateContent xmlns:mc="http://schemas.openxmlformats.org/markup-compatibility/2006">
+        <mc:Choice xmlns:a14="http://schemas.microsoft.com/office/drawing/2010/main" Requires="a14">
           <p:sp>
             <p:nvSpPr>
               <p:cNvPr id="50" name="Rectangle 49">
@@ -29034,7 +29034,7 @@
             <p:spPr>
               <a:xfrm>
                 <a:off x="4193827" y="4031777"/>
-                <a:ext cx="4652556" cy="1052660"/>
+                <a:ext cx="4816190" cy="1052660"/>
               </a:xfrm>
               <a:prstGeom prst="rect">
                 <a:avLst/>
@@ -29073,11 +29073,11 @@
                         </m:e>
                         <m:sub>
                           <m:r>
-                            <a:rPr lang="en-US" sz="3200" i="1">
+                            <a:rPr lang="en-US" sz="3200" b="0" i="1" smtClean="0">
                               <a:latin typeface="Cambria Math" panose="02040503050406030204" pitchFamily="18" charset="0"/>
                               <a:cs typeface="Times New Roman" panose="02020603050405020304" pitchFamily="18" charset="0"/>
                             </a:rPr>
-                            <m:t>2</m:t>
+                            <m:t>10</m:t>
                           </m:r>
                         </m:sub>
                       </m:sSub>
@@ -29225,7 +29225,7 @@
             </p:txBody>
           </p:sp>
         </mc:Choice>
-        <mc:Fallback xmlns="">
+        <mc:Fallback>
           <p:sp>
             <p:nvSpPr>
               <p:cNvPr id="50" name="Rectangle 49">
@@ -29243,7 +29243,7 @@
             <p:spPr>
               <a:xfrm>
                 <a:off x="4193827" y="4031777"/>
-                <a:ext cx="4652556" cy="1052660"/>
+                <a:ext cx="4816190" cy="1052660"/>
               </a:xfrm>
               <a:prstGeom prst="rect">
                 <a:avLst/>
@@ -29251,7 +29251,7 @@
               <a:blipFill>
                 <a:blip r:embed="rId3"/>
                 <a:stretch>
-                  <a:fillRect l="-543" t="-73810" r="-543" b="-67857"/>
+                  <a:fillRect l="-263" t="-73810" r="-526" b="-67857"/>
                 </a:stretch>
               </a:blipFill>
             </p:spPr>
@@ -30264,14 +30264,14 @@
                 <a:latin typeface="Times New Roman" panose="02020603050405020304" pitchFamily="18" charset="0"/>
                 <a:cs typeface="Times New Roman" panose="02020603050405020304" pitchFamily="18" charset="0"/>
               </a:rPr>
-              <a:t>2</a:t>
+              <a:t>10</a:t>
             </a:r>
             <a:r>
               <a:rPr lang="en-US" dirty="0">
                 <a:latin typeface="Times New Roman" panose="02020603050405020304" pitchFamily="18" charset="0"/>
                 <a:cs typeface="Times New Roman" panose="02020603050405020304" pitchFamily="18" charset="0"/>
               </a:rPr>
-              <a:t>(41*16*16*11*11*11/101)*(1-0.4) = 10.24658</a:t>
+              <a:t>(41*16*16*11*11*11/101)*(1-0.4) = 3.084528</a:t>
             </a:r>
             <a:endParaRPr lang="en-US" dirty="0"/>
           </a:p>
@@ -30370,14 +30370,14 @@
                 <a:latin typeface="Times New Roman" panose="02020603050405020304" pitchFamily="18" charset="0"/>
                 <a:cs typeface="Times New Roman" panose="02020603050405020304" pitchFamily="18" charset="0"/>
               </a:rPr>
-              <a:t>2</a:t>
+              <a:t>10</a:t>
             </a:r>
             <a:r>
               <a:rPr lang="en-US" dirty="0">
                 <a:latin typeface="Times New Roman" panose="02020603050405020304" pitchFamily="18" charset="0"/>
                 <a:cs typeface="Times New Roman" panose="02020603050405020304" pitchFamily="18" charset="0"/>
               </a:rPr>
-              <a:t>(41*31*31/101) * (1-0.4) = 5.164637</a:t>
+              <a:t>(41*31*31/101) * (1-0.4) = 1.554712</a:t>
             </a:r>
             <a:endParaRPr lang="en-US" dirty="0"/>
           </a:p>
@@ -30609,14 +30609,14 @@
                 <a:latin typeface="Times New Roman" panose="02020603050405020304" pitchFamily="18" charset="0"/>
                 <a:cs typeface="Times New Roman" panose="02020603050405020304" pitchFamily="18" charset="0"/>
               </a:rPr>
-              <a:t>2</a:t>
+              <a:t>10</a:t>
             </a:r>
             <a:r>
               <a:rPr lang="en-US" dirty="0">
                 <a:latin typeface="Times New Roman" panose="02020603050405020304" pitchFamily="18" charset="0"/>
                 <a:cs typeface="Times New Roman" panose="02020603050405020304" pitchFamily="18" charset="0"/>
               </a:rPr>
-              <a:t>(96*6/101)*(1-0.95) = 0.1255857</a:t>
+              <a:t>(96*6/101)*(1-0.95) = 0.03780506</a:t>
             </a:r>
             <a:endParaRPr lang="en-US" dirty="0"/>
           </a:p>

</xml_diff>

<commit_message>
Fix the err message
</commit_message>
<xml_diff>
--- a/Document/Librator.pptx
+++ b/Document/Librator.pptx
@@ -133,30 +133,12 @@
 <pc:chgInfo xmlns:a="http://schemas.openxmlformats.org/drawingml/2006/main" xmlns:r="http://schemas.openxmlformats.org/officeDocument/2006/relationships" xmlns:ac="http://schemas.microsoft.com/office/drawing/2013/main/command" xmlns:pc="http://schemas.microsoft.com/office/powerpoint/2013/main/command">
   <pc:docChgLst>
     <pc:chgData name="Lei Li" userId="S::leil@uchicago.edu::6a72cb10-d67c-4469-a963-3b31f80f7cc3" providerId="AD" clId="Web-{E9A4D163-5C2E-4945-8A05-7CA0AC73D7E0}"/>
-    <pc:docChg chg="modSld">
-      <pc:chgData name="Lei Li" userId="S::leil@uchicago.edu::6a72cb10-d67c-4469-a963-3b31f80f7cc3" providerId="AD" clId="Web-{E9A4D163-5C2E-4945-8A05-7CA0AC73D7E0}" dt="2019-09-20T02:13:49.833" v="161" actId="20577"/>
-      <pc:docMkLst>
-        <pc:docMk/>
-      </pc:docMkLst>
-    </pc:docChg>
   </pc:docChgLst>
   <pc:docChgLst>
     <pc:chgData name="Lei Li" userId="S::leil@uchicago.edu::6a72cb10-d67c-4469-a963-3b31f80f7cc3" providerId="AD" clId="Web-{FE052655-46E8-C193-F081-A098569FF8D1}"/>
-    <pc:docChg chg="modSld">
-      <pc:chgData name="Lei Li" userId="S::leil@uchicago.edu::6a72cb10-d67c-4469-a963-3b31f80f7cc3" providerId="AD" clId="Web-{FE052655-46E8-C193-F081-A098569FF8D1}" dt="2019-09-20T03:23:27.037" v="7" actId="20577"/>
-      <pc:docMkLst>
-        <pc:docMk/>
-      </pc:docMkLst>
-    </pc:docChg>
   </pc:docChgLst>
   <pc:docChgLst>
     <pc:chgData name="Lei Li" userId="S::leil@uchicago.edu::6a72cb10-d67c-4469-a963-3b31f80f7cc3" providerId="AD" clId="Web-{CF16291D-0732-9411-4792-FA401C1BBA48}"/>
-    <pc:docChg chg="modSld">
-      <pc:chgData name="Lei Li" userId="S::leil@uchicago.edu::6a72cb10-d67c-4469-a963-3b31f80f7cc3" providerId="AD" clId="Web-{CF16291D-0732-9411-4792-FA401C1BBA48}" dt="2019-09-20T14:23:13.730" v="35" actId="14100"/>
-      <pc:docMkLst>
-        <pc:docMk/>
-      </pc:docMkLst>
-    </pc:docChg>
   </pc:docChgLst>
 </pc:chgInfo>
 </file>
@@ -12184,7 +12166,7 @@
           <a:p>
             <a:fld id="{B55D29DC-5CFD-5C40-8399-0CA08882BC4A}" type="datetimeFigureOut">
               <a:rPr lang="en-US" smtClean="0"/>
-              <a:t>1/13/20</a:t>
+              <a:t>1/15/20</a:t>
             </a:fld>
             <a:endParaRPr lang="en-US"/>
           </a:p>
@@ -12598,7 +12580,7 @@
           <a:p>
             <a:fld id="{F02628E0-3F55-E64B-866B-185FD039DD29}" type="datetimeFigureOut">
               <a:rPr lang="en-US" smtClean="0"/>
-              <a:t>1/13/20</a:t>
+              <a:t>1/15/20</a:t>
             </a:fld>
             <a:endParaRPr lang="en-US"/>
           </a:p>
@@ -12796,7 +12778,7 @@
           <a:p>
             <a:fld id="{F02628E0-3F55-E64B-866B-185FD039DD29}" type="datetimeFigureOut">
               <a:rPr lang="en-US" smtClean="0"/>
-              <a:t>1/13/20</a:t>
+              <a:t>1/15/20</a:t>
             </a:fld>
             <a:endParaRPr lang="en-US"/>
           </a:p>
@@ -13004,7 +12986,7 @@
           <a:p>
             <a:fld id="{F02628E0-3F55-E64B-866B-185FD039DD29}" type="datetimeFigureOut">
               <a:rPr lang="en-US" smtClean="0"/>
-              <a:t>1/13/20</a:t>
+              <a:t>1/15/20</a:t>
             </a:fld>
             <a:endParaRPr lang="en-US"/>
           </a:p>
@@ -13202,7 +13184,7 @@
           <a:p>
             <a:fld id="{F02628E0-3F55-E64B-866B-185FD039DD29}" type="datetimeFigureOut">
               <a:rPr lang="en-US" smtClean="0"/>
-              <a:t>1/13/20</a:t>
+              <a:t>1/15/20</a:t>
             </a:fld>
             <a:endParaRPr lang="en-US"/>
           </a:p>
@@ -13477,7 +13459,7 @@
           <a:p>
             <a:fld id="{F02628E0-3F55-E64B-866B-185FD039DD29}" type="datetimeFigureOut">
               <a:rPr lang="en-US" smtClean="0"/>
-              <a:t>1/13/20</a:t>
+              <a:t>1/15/20</a:t>
             </a:fld>
             <a:endParaRPr lang="en-US"/>
           </a:p>
@@ -13742,7 +13724,7 @@
           <a:p>
             <a:fld id="{F02628E0-3F55-E64B-866B-185FD039DD29}" type="datetimeFigureOut">
               <a:rPr lang="en-US" smtClean="0"/>
-              <a:t>1/13/20</a:t>
+              <a:t>1/15/20</a:t>
             </a:fld>
             <a:endParaRPr lang="en-US"/>
           </a:p>
@@ -14154,7 +14136,7 @@
           <a:p>
             <a:fld id="{F02628E0-3F55-E64B-866B-185FD039DD29}" type="datetimeFigureOut">
               <a:rPr lang="en-US" smtClean="0"/>
-              <a:t>1/13/20</a:t>
+              <a:t>1/15/20</a:t>
             </a:fld>
             <a:endParaRPr lang="en-US"/>
           </a:p>
@@ -14295,7 +14277,7 @@
           <a:p>
             <a:fld id="{F02628E0-3F55-E64B-866B-185FD039DD29}" type="datetimeFigureOut">
               <a:rPr lang="en-US" smtClean="0"/>
-              <a:t>1/13/20</a:t>
+              <a:t>1/15/20</a:t>
             </a:fld>
             <a:endParaRPr lang="en-US"/>
           </a:p>
@@ -14408,7 +14390,7 @@
           <a:p>
             <a:fld id="{F02628E0-3F55-E64B-866B-185FD039DD29}" type="datetimeFigureOut">
               <a:rPr lang="en-US" smtClean="0"/>
-              <a:t>1/13/20</a:t>
+              <a:t>1/15/20</a:t>
             </a:fld>
             <a:endParaRPr lang="en-US"/>
           </a:p>
@@ -14719,7 +14701,7 @@
           <a:p>
             <a:fld id="{F02628E0-3F55-E64B-866B-185FD039DD29}" type="datetimeFigureOut">
               <a:rPr lang="en-US" smtClean="0"/>
-              <a:t>1/13/20</a:t>
+              <a:t>1/15/20</a:t>
             </a:fld>
             <a:endParaRPr lang="en-US"/>
           </a:p>
@@ -15007,7 +14989,7 @@
           <a:p>
             <a:fld id="{F02628E0-3F55-E64B-866B-185FD039DD29}" type="datetimeFigureOut">
               <a:rPr lang="en-US" smtClean="0"/>
-              <a:t>1/13/20</a:t>
+              <a:t>1/15/20</a:t>
             </a:fld>
             <a:endParaRPr lang="en-US"/>
           </a:p>
@@ -15248,7 +15230,7 @@
           <a:p>
             <a:fld id="{F02628E0-3F55-E64B-866B-185FD039DD29}" type="datetimeFigureOut">
               <a:rPr lang="en-US" smtClean="0"/>
-              <a:t>1/13/20</a:t>
+              <a:t>1/15/20</a:t>
             </a:fld>
             <a:endParaRPr lang="en-US"/>
           </a:p>
@@ -28570,8 +28552,8 @@
           </a:p>
         </p:txBody>
       </p:sp>
-      <mc:AlternateContent xmlns:mc="http://schemas.openxmlformats.org/markup-compatibility/2006">
-        <mc:Choice xmlns:a14="http://schemas.microsoft.com/office/drawing/2010/main" Requires="a14">
+      <mc:AlternateContent xmlns:mc="http://schemas.openxmlformats.org/markup-compatibility/2006" xmlns:a14="http://schemas.microsoft.com/office/drawing/2010/main">
+        <mc:Choice Requires="a14">
           <p:sp>
             <p:nvSpPr>
               <p:cNvPr id="3" name="Content Placeholder 2">
@@ -28973,7 +28955,7 @@
             </p:txBody>
           </p:sp>
         </mc:Choice>
-        <mc:Fallback>
+        <mc:Fallback xmlns="">
           <p:sp>
             <p:nvSpPr>
               <p:cNvPr id="3" name="Content Placeholder 2">
@@ -29017,8 +28999,8 @@
           </p:sp>
         </mc:Fallback>
       </mc:AlternateContent>
-      <mc:AlternateContent xmlns:mc="http://schemas.openxmlformats.org/markup-compatibility/2006">
-        <mc:Choice xmlns:a14="http://schemas.microsoft.com/office/drawing/2010/main" Requires="a14">
+      <mc:AlternateContent xmlns:mc="http://schemas.openxmlformats.org/markup-compatibility/2006" xmlns:a14="http://schemas.microsoft.com/office/drawing/2010/main">
+        <mc:Choice Requires="a14">
           <p:sp>
             <p:nvSpPr>
               <p:cNvPr id="50" name="Rectangle 49">
@@ -29225,7 +29207,7 @@
             </p:txBody>
           </p:sp>
         </mc:Choice>
-        <mc:Fallback>
+        <mc:Fallback xmlns="">
           <p:sp>
             <p:nvSpPr>
               <p:cNvPr id="50" name="Rectangle 49">

</xml_diff>